<commit_message>
slight change in graphics
</commit_message>
<xml_diff>
--- a/User Scenario.pptx
+++ b/User Scenario.pptx
@@ -291,7 +291,7 @@
           <a:p>
             <a:fld id="{9CE5AB0F-7D16-E942-87B9-B9C32CCB6523}" type="datetimeFigureOut">
               <a:rPr lang="en-US" smtClean="0"/>
-              <a:t>12/14/14</a:t>
+              <a:t>12/16/14</a:t>
             </a:fld>
             <a:endParaRPr lang="en-US"/>
           </a:p>
@@ -461,7 +461,7 @@
           <a:p>
             <a:fld id="{9CE5AB0F-7D16-E942-87B9-B9C32CCB6523}" type="datetimeFigureOut">
               <a:rPr lang="en-US" smtClean="0"/>
-              <a:t>12/14/14</a:t>
+              <a:t>12/16/14</a:t>
             </a:fld>
             <a:endParaRPr lang="en-US"/>
           </a:p>
@@ -641,7 +641,7 @@
           <a:p>
             <a:fld id="{9CE5AB0F-7D16-E942-87B9-B9C32CCB6523}" type="datetimeFigureOut">
               <a:rPr lang="en-US" smtClean="0"/>
-              <a:t>12/14/14</a:t>
+              <a:t>12/16/14</a:t>
             </a:fld>
             <a:endParaRPr lang="en-US"/>
           </a:p>
@@ -811,7 +811,7 @@
           <a:p>
             <a:fld id="{9CE5AB0F-7D16-E942-87B9-B9C32CCB6523}" type="datetimeFigureOut">
               <a:rPr lang="en-US" smtClean="0"/>
-              <a:t>12/14/14</a:t>
+              <a:t>12/16/14</a:t>
             </a:fld>
             <a:endParaRPr lang="en-US"/>
           </a:p>
@@ -1057,7 +1057,7 @@
           <a:p>
             <a:fld id="{9CE5AB0F-7D16-E942-87B9-B9C32CCB6523}" type="datetimeFigureOut">
               <a:rPr lang="en-US" smtClean="0"/>
-              <a:t>12/14/14</a:t>
+              <a:t>12/16/14</a:t>
             </a:fld>
             <a:endParaRPr lang="en-US"/>
           </a:p>
@@ -1345,7 +1345,7 @@
           <a:p>
             <a:fld id="{9CE5AB0F-7D16-E942-87B9-B9C32CCB6523}" type="datetimeFigureOut">
               <a:rPr lang="en-US" smtClean="0"/>
-              <a:t>12/14/14</a:t>
+              <a:t>12/16/14</a:t>
             </a:fld>
             <a:endParaRPr lang="en-US"/>
           </a:p>
@@ -1767,7 +1767,7 @@
           <a:p>
             <a:fld id="{9CE5AB0F-7D16-E942-87B9-B9C32CCB6523}" type="datetimeFigureOut">
               <a:rPr lang="en-US" smtClean="0"/>
-              <a:t>12/14/14</a:t>
+              <a:t>12/16/14</a:t>
             </a:fld>
             <a:endParaRPr lang="en-US"/>
           </a:p>
@@ -1885,7 +1885,7 @@
           <a:p>
             <a:fld id="{9CE5AB0F-7D16-E942-87B9-B9C32CCB6523}" type="datetimeFigureOut">
               <a:rPr lang="en-US" smtClean="0"/>
-              <a:t>12/14/14</a:t>
+              <a:t>12/16/14</a:t>
             </a:fld>
             <a:endParaRPr lang="en-US"/>
           </a:p>
@@ -1980,7 +1980,7 @@
           <a:p>
             <a:fld id="{9CE5AB0F-7D16-E942-87B9-B9C32CCB6523}" type="datetimeFigureOut">
               <a:rPr lang="en-US" smtClean="0"/>
-              <a:t>12/14/14</a:t>
+              <a:t>12/16/14</a:t>
             </a:fld>
             <a:endParaRPr lang="en-US"/>
           </a:p>
@@ -2257,7 +2257,7 @@
           <a:p>
             <a:fld id="{9CE5AB0F-7D16-E942-87B9-B9C32CCB6523}" type="datetimeFigureOut">
               <a:rPr lang="en-US" smtClean="0"/>
-              <a:t>12/14/14</a:t>
+              <a:t>12/16/14</a:t>
             </a:fld>
             <a:endParaRPr lang="en-US"/>
           </a:p>
@@ -2510,7 +2510,7 @@
           <a:p>
             <a:fld id="{9CE5AB0F-7D16-E942-87B9-B9C32CCB6523}" type="datetimeFigureOut">
               <a:rPr lang="en-US" smtClean="0"/>
-              <a:t>12/14/14</a:t>
+              <a:t>12/16/14</a:t>
             </a:fld>
             <a:endParaRPr lang="en-US"/>
           </a:p>
@@ -2723,7 +2723,7 @@
           <a:p>
             <a:fld id="{9CE5AB0F-7D16-E942-87B9-B9C32CCB6523}" type="datetimeFigureOut">
               <a:rPr lang="en-US" smtClean="0"/>
-              <a:t>12/14/14</a:t>
+              <a:t>12/16/14</a:t>
             </a:fld>
             <a:endParaRPr lang="en-US"/>
           </a:p>
@@ -3266,9 +3266,39 @@
           </a:prstGeom>
         </p:spPr>
       </p:pic>
+      <p:sp>
+        <p:nvSpPr>
+          <p:cNvPr id="6" name="TextBox 5"/>
+          <p:cNvSpPr txBox="1"/>
+          <p:nvPr/>
+        </p:nvSpPr>
+        <p:spPr>
+          <a:xfrm>
+            <a:off x="1681239" y="2660954"/>
+            <a:ext cx="471713" cy="1200329"/>
+          </a:xfrm>
+          <a:prstGeom prst="rect">
+            <a:avLst/>
+          </a:prstGeom>
+          <a:noFill/>
+        </p:spPr>
+        <p:txBody>
+          <a:bodyPr wrap="square" rtlCol="0">
+            <a:spAutoFit/>
+          </a:bodyPr>
+          <a:lstStyle/>
+          <a:p>
+            <a:r>
+              <a:rPr lang="en-US" sz="7200" dirty="0" smtClean="0"/>
+              <a:t>!</a:t>
+            </a:r>
+            <a:endParaRPr lang="en-US" sz="7200" dirty="0"/>
+          </a:p>
+        </p:txBody>
+      </p:sp>
       <p:pic>
         <p:nvPicPr>
-          <p:cNvPr id="5" name="Picture 4" descr="fb-share.png"/>
+          <p:cNvPr id="2" name="Picture 1" descr="Screen Shot 2014-12-16 at 12.02.58 AM.png"/>
           <p:cNvPicPr>
             <a:picLocks noChangeAspect="1"/>
           </p:cNvPicPr>
@@ -3288,44 +3318,14 @@
         </p:blipFill>
         <p:spPr>
           <a:xfrm>
-            <a:off x="3927295" y="3695095"/>
-            <a:ext cx="4406323" cy="2243365"/>
+            <a:off x="3610731" y="2759937"/>
+            <a:ext cx="5267174" cy="3033681"/>
           </a:xfrm>
           <a:prstGeom prst="rect">
             <a:avLst/>
           </a:prstGeom>
         </p:spPr>
       </p:pic>
-      <p:sp>
-        <p:nvSpPr>
-          <p:cNvPr id="6" name="TextBox 5"/>
-          <p:cNvSpPr txBox="1"/>
-          <p:nvPr/>
-        </p:nvSpPr>
-        <p:spPr>
-          <a:xfrm>
-            <a:off x="1681239" y="2660954"/>
-            <a:ext cx="471713" cy="1200329"/>
-          </a:xfrm>
-          <a:prstGeom prst="rect">
-            <a:avLst/>
-          </a:prstGeom>
-          <a:noFill/>
-        </p:spPr>
-        <p:txBody>
-          <a:bodyPr wrap="square" rtlCol="0">
-            <a:spAutoFit/>
-          </a:bodyPr>
-          <a:lstStyle/>
-          <a:p>
-            <a:r>
-              <a:rPr lang="en-US" sz="7200" dirty="0" smtClean="0"/>
-              <a:t>!</a:t>
-            </a:r>
-            <a:endParaRPr lang="en-US" sz="7200" dirty="0"/>
-          </a:p>
-        </p:txBody>
-      </p:sp>
     </p:spTree>
     <p:extLst>
       <p:ext uri="{BB962C8B-B14F-4D97-AF65-F5344CB8AC3E}">

</xml_diff>